<commit_message>
sap 4 5 done
</commit_message>
<xml_diff>
--- a/Kontrabas.pptx
+++ b/Kontrabas.pptx
@@ -5,23 +5,25 @@
     <p:sldMasterId id="2147483659" r:id="rId1"/>
   </p:sldMasterIdLst>
   <p:notesMasterIdLst>
-    <p:notesMasterId r:id="rId16"/>
+    <p:notesMasterId r:id="rId18"/>
   </p:notesMasterIdLst>
   <p:sldIdLst>
     <p:sldId id="256" r:id="rId2"/>
     <p:sldId id="257" r:id="rId3"/>
     <p:sldId id="258" r:id="rId4"/>
     <p:sldId id="259" r:id="rId5"/>
-    <p:sldId id="270" r:id="rId6"/>
-    <p:sldId id="271" r:id="rId7"/>
-    <p:sldId id="264" r:id="rId8"/>
-    <p:sldId id="265" r:id="rId9"/>
-    <p:sldId id="266" r:id="rId10"/>
-    <p:sldId id="267" r:id="rId11"/>
-    <p:sldId id="268" r:id="rId12"/>
-    <p:sldId id="269" r:id="rId13"/>
-    <p:sldId id="272" r:id="rId14"/>
-    <p:sldId id="263" r:id="rId15"/>
+    <p:sldId id="273" r:id="rId6"/>
+    <p:sldId id="274" r:id="rId7"/>
+    <p:sldId id="270" r:id="rId8"/>
+    <p:sldId id="271" r:id="rId9"/>
+    <p:sldId id="264" r:id="rId10"/>
+    <p:sldId id="265" r:id="rId11"/>
+    <p:sldId id="266" r:id="rId12"/>
+    <p:sldId id="267" r:id="rId13"/>
+    <p:sldId id="268" r:id="rId14"/>
+    <p:sldId id="269" r:id="rId15"/>
+    <p:sldId id="272" r:id="rId16"/>
+    <p:sldId id="263" r:id="rId17"/>
   </p:sldIdLst>
   <p:sldSz cx="9144000" cy="5143500" type="screen16x9"/>
   <p:notesSz cx="6858000" cy="9144000"/>
@@ -6147,6 +6149,186 @@
       </p:grpSpPr>
       <p:pic>
         <p:nvPicPr>
+          <p:cNvPr id="9" name="Рисунок 8">
+            <a:extLst>
+              <a:ext uri="{FF2B5EF4-FFF2-40B4-BE49-F238E27FC236}">
+                <a16:creationId xmlns:a16="http://schemas.microsoft.com/office/drawing/2014/main" id="{064F9743-649A-42D6-B21B-24BF43BF603C}"/>
+              </a:ext>
+            </a:extLst>
+          </p:cNvPr>
+          <p:cNvPicPr>
+            <a:picLocks noChangeAspect="1"/>
+          </p:cNvPicPr>
+          <p:nvPr/>
+        </p:nvPicPr>
+        <p:blipFill>
+          <a:blip r:embed="rId2"/>
+          <a:stretch>
+            <a:fillRect/>
+          </a:stretch>
+        </p:blipFill>
+        <p:spPr>
+          <a:xfrm>
+            <a:off x="59827" y="74506"/>
+            <a:ext cx="5250466" cy="2523202"/>
+          </a:xfrm>
+          <a:prstGeom prst="rect">
+            <a:avLst/>
+          </a:prstGeom>
+        </p:spPr>
+      </p:pic>
+      <p:pic>
+        <p:nvPicPr>
+          <p:cNvPr id="11" name="Рисунок 10">
+            <a:extLst>
+              <a:ext uri="{FF2B5EF4-FFF2-40B4-BE49-F238E27FC236}">
+                <a16:creationId xmlns:a16="http://schemas.microsoft.com/office/drawing/2014/main" id="{8BAF3749-B0C5-45D1-8A3A-E9A4BDC12E49}"/>
+              </a:ext>
+            </a:extLst>
+          </p:cNvPr>
+          <p:cNvPicPr>
+            <a:picLocks noChangeAspect="1"/>
+          </p:cNvPicPr>
+          <p:nvPr/>
+        </p:nvPicPr>
+        <p:blipFill>
+          <a:blip r:embed="rId3"/>
+          <a:stretch>
+            <a:fillRect/>
+          </a:stretch>
+        </p:blipFill>
+        <p:spPr>
+          <a:xfrm>
+            <a:off x="3598841" y="2465336"/>
+            <a:ext cx="5253905" cy="2523202"/>
+          </a:xfrm>
+          <a:prstGeom prst="rect">
+            <a:avLst/>
+          </a:prstGeom>
+        </p:spPr>
+      </p:pic>
+    </p:spTree>
+    <p:extLst>
+      <p:ext uri="{BB962C8B-B14F-4D97-AF65-F5344CB8AC3E}">
+        <p14:creationId xmlns:p14="http://schemas.microsoft.com/office/powerpoint/2010/main" val="4169892446"/>
+      </p:ext>
+    </p:extLst>
+  </p:cSld>
+  <p:clrMapOvr>
+    <a:masterClrMapping/>
+  </p:clrMapOvr>
+</p:sld>
+</file>
+
+<file path=ppt/slides/slide11.xml><?xml version="1.0" encoding="utf-8"?>
+<p:sld xmlns:a="http://schemas.openxmlformats.org/drawingml/2006/main" xmlns:r="http://schemas.openxmlformats.org/officeDocument/2006/relationships" xmlns:p="http://schemas.openxmlformats.org/presentationml/2006/main">
+  <p:cSld>
+    <p:spTree>
+      <p:nvGrpSpPr>
+        <p:cNvPr id="1" name=""/>
+        <p:cNvGrpSpPr/>
+        <p:nvPr/>
+      </p:nvGrpSpPr>
+      <p:grpSpPr>
+        <a:xfrm>
+          <a:off x="0" y="0"/>
+          <a:ext cx="0" cy="0"/>
+          <a:chOff x="0" y="0"/>
+          <a:chExt cx="0" cy="0"/>
+        </a:xfrm>
+      </p:grpSpPr>
+      <p:pic>
+        <p:nvPicPr>
+          <p:cNvPr id="6" name="Рисунок 5">
+            <a:extLst>
+              <a:ext uri="{FF2B5EF4-FFF2-40B4-BE49-F238E27FC236}">
+                <a16:creationId xmlns:a16="http://schemas.microsoft.com/office/drawing/2014/main" id="{1A1A6D26-AF5A-44EC-91CB-A49CB20551A7}"/>
+              </a:ext>
+            </a:extLst>
+          </p:cNvPr>
+          <p:cNvPicPr>
+            <a:picLocks noChangeAspect="1"/>
+          </p:cNvPicPr>
+          <p:nvPr/>
+        </p:nvPicPr>
+        <p:blipFill>
+          <a:blip r:embed="rId2"/>
+          <a:stretch>
+            <a:fillRect/>
+          </a:stretch>
+        </p:blipFill>
+        <p:spPr>
+          <a:xfrm>
+            <a:off x="123168" y="135191"/>
+            <a:ext cx="4448832" cy="2615018"/>
+          </a:xfrm>
+          <a:prstGeom prst="rect">
+            <a:avLst/>
+          </a:prstGeom>
+        </p:spPr>
+      </p:pic>
+      <p:pic>
+        <p:nvPicPr>
+          <p:cNvPr id="5" name="Рисунок 4">
+            <a:extLst>
+              <a:ext uri="{FF2B5EF4-FFF2-40B4-BE49-F238E27FC236}">
+                <a16:creationId xmlns:a16="http://schemas.microsoft.com/office/drawing/2014/main" id="{D7AE587F-BF27-4877-80B1-7A3D8A7FE742}"/>
+              </a:ext>
+            </a:extLst>
+          </p:cNvPr>
+          <p:cNvPicPr>
+            <a:picLocks noChangeAspect="1"/>
+          </p:cNvPicPr>
+          <p:nvPr/>
+        </p:nvPicPr>
+        <p:blipFill>
+          <a:blip r:embed="rId3"/>
+          <a:stretch>
+            <a:fillRect/>
+          </a:stretch>
+        </p:blipFill>
+        <p:spPr>
+          <a:xfrm>
+            <a:off x="3791150" y="2483995"/>
+            <a:ext cx="5068243" cy="2460181"/>
+          </a:xfrm>
+          <a:prstGeom prst="rect">
+            <a:avLst/>
+          </a:prstGeom>
+        </p:spPr>
+      </p:pic>
+    </p:spTree>
+    <p:extLst>
+      <p:ext uri="{BB962C8B-B14F-4D97-AF65-F5344CB8AC3E}">
+        <p14:creationId xmlns:p14="http://schemas.microsoft.com/office/powerpoint/2010/main" val="1062779483"/>
+      </p:ext>
+    </p:extLst>
+  </p:cSld>
+  <p:clrMapOvr>
+    <a:masterClrMapping/>
+  </p:clrMapOvr>
+</p:sld>
+</file>
+
+<file path=ppt/slides/slide12.xml><?xml version="1.0" encoding="utf-8"?>
+<p:sld xmlns:a="http://schemas.openxmlformats.org/drawingml/2006/main" xmlns:r="http://schemas.openxmlformats.org/officeDocument/2006/relationships" xmlns:p="http://schemas.openxmlformats.org/presentationml/2006/main">
+  <p:cSld>
+    <p:spTree>
+      <p:nvGrpSpPr>
+        <p:cNvPr id="1" name=""/>
+        <p:cNvGrpSpPr/>
+        <p:nvPr/>
+      </p:nvGrpSpPr>
+      <p:grpSpPr>
+        <a:xfrm>
+          <a:off x="0" y="0"/>
+          <a:ext cx="0" cy="0"/>
+          <a:chOff x="0" y="0"/>
+          <a:chExt cx="0" cy="0"/>
+        </a:xfrm>
+      </p:grpSpPr>
+      <p:pic>
+        <p:nvPicPr>
           <p:cNvPr id="13" name="Рисунок 12">
             <a:extLst>
               <a:ext uri="{FF2B5EF4-FFF2-40B4-BE49-F238E27FC236}">
@@ -6218,7 +6400,7 @@
 </p:sld>
 </file>
 
-<file path=ppt/slides/slide11.xml><?xml version="1.0" encoding="utf-8"?>
+<file path=ppt/slides/slide13.xml><?xml version="1.0" encoding="utf-8"?>
 <p:sld xmlns:a="http://schemas.openxmlformats.org/drawingml/2006/main" xmlns:r="http://schemas.openxmlformats.org/officeDocument/2006/relationships" xmlns:p="http://schemas.openxmlformats.org/presentationml/2006/main">
   <p:cSld>
     <p:spTree>
@@ -6278,7 +6460,7 @@
 </p:sld>
 </file>
 
-<file path=ppt/slides/slide12.xml><?xml version="1.0" encoding="utf-8"?>
+<file path=ppt/slides/slide14.xml><?xml version="1.0" encoding="utf-8"?>
 <p:sld xmlns:a="http://schemas.openxmlformats.org/drawingml/2006/main" xmlns:r="http://schemas.openxmlformats.org/officeDocument/2006/relationships" xmlns:p="http://schemas.openxmlformats.org/presentationml/2006/main">
   <p:cSld>
     <p:spTree>
@@ -6398,7 +6580,7 @@
 </p:sld>
 </file>
 
-<file path=ppt/slides/slide13.xml><?xml version="1.0" encoding="utf-8"?>
+<file path=ppt/slides/slide15.xml><?xml version="1.0" encoding="utf-8"?>
 <p:sld xmlns:a="http://schemas.openxmlformats.org/drawingml/2006/main" xmlns:r="http://schemas.openxmlformats.org/officeDocument/2006/relationships" xmlns:p="http://schemas.openxmlformats.org/presentationml/2006/main">
   <p:cSld>
     <p:spTree>
@@ -6491,7 +6673,7 @@
 </p:sld>
 </file>
 
-<file path=ppt/slides/slide14.xml><?xml version="1.0" encoding="utf-8"?>
+<file path=ppt/slides/slide16.xml><?xml version="1.0" encoding="utf-8"?>
 <p:sld xmlns:a="http://schemas.openxmlformats.org/drawingml/2006/main" xmlns:r="http://schemas.openxmlformats.org/officeDocument/2006/relationships" xmlns:p="http://schemas.openxmlformats.org/presentationml/2006/main">
   <p:cSld>
     <p:spTree>
@@ -8756,6 +8938,212 @@
           <p:cNvPr id="2" name="Заголовок 1">
             <a:extLst>
               <a:ext uri="{FF2B5EF4-FFF2-40B4-BE49-F238E27FC236}">
+                <a16:creationId xmlns:a16="http://schemas.microsoft.com/office/drawing/2014/main" id="{E0FBA8F4-A501-4FCE-9056-28B3F18172AE}"/>
+              </a:ext>
+            </a:extLst>
+          </p:cNvPr>
+          <p:cNvSpPr>
+            <a:spLocks noGrp="1"/>
+          </p:cNvSpPr>
+          <p:nvPr>
+            <p:ph type="title"/>
+          </p:nvPr>
+        </p:nvSpPr>
+        <p:spPr/>
+        <p:txBody>
+          <a:bodyPr/>
+          <a:lstStyle/>
+          <a:p>
+            <a:r>
+              <a:rPr lang="ru-RU" dirty="0"/>
+              <a:t>Исследования</a:t>
+            </a:r>
+          </a:p>
+        </p:txBody>
+      </p:sp>
+      <p:pic>
+        <p:nvPicPr>
+          <p:cNvPr id="5" name="Рисунок 4">
+            <a:extLst>
+              <a:ext uri="{FF2B5EF4-FFF2-40B4-BE49-F238E27FC236}">
+                <a16:creationId xmlns:a16="http://schemas.microsoft.com/office/drawing/2014/main" id="{5AEDCB52-D290-4683-ABF6-17CB1B628C56}"/>
+              </a:ext>
+            </a:extLst>
+          </p:cNvPr>
+          <p:cNvPicPr>
+            <a:picLocks noChangeAspect="1"/>
+          </p:cNvPicPr>
+          <p:nvPr/>
+        </p:nvPicPr>
+        <p:blipFill>
+          <a:blip r:embed="rId2"/>
+          <a:stretch>
+            <a:fillRect/>
+          </a:stretch>
+        </p:blipFill>
+        <p:spPr>
+          <a:xfrm>
+            <a:off x="2072639" y="1333364"/>
+            <a:ext cx="4841567" cy="3086406"/>
+          </a:xfrm>
+          <a:prstGeom prst="rect">
+            <a:avLst/>
+          </a:prstGeom>
+        </p:spPr>
+      </p:pic>
+    </p:spTree>
+    <p:extLst>
+      <p:ext uri="{BB962C8B-B14F-4D97-AF65-F5344CB8AC3E}">
+        <p14:creationId xmlns:p14="http://schemas.microsoft.com/office/powerpoint/2010/main" val="3997381363"/>
+      </p:ext>
+    </p:extLst>
+  </p:cSld>
+  <p:clrMapOvr>
+    <a:masterClrMapping/>
+  </p:clrMapOvr>
+</p:sld>
+</file>
+
+<file path=ppt/slides/slide6.xml><?xml version="1.0" encoding="utf-8"?>
+<p:sld xmlns:a="http://schemas.openxmlformats.org/drawingml/2006/main" xmlns:r="http://schemas.openxmlformats.org/officeDocument/2006/relationships" xmlns:p="http://schemas.openxmlformats.org/presentationml/2006/main">
+  <p:cSld>
+    <p:spTree>
+      <p:nvGrpSpPr>
+        <p:cNvPr id="1" name=""/>
+        <p:cNvGrpSpPr/>
+        <p:nvPr/>
+      </p:nvGrpSpPr>
+      <p:grpSpPr>
+        <a:xfrm>
+          <a:off x="0" y="0"/>
+          <a:ext cx="0" cy="0"/>
+          <a:chOff x="0" y="0"/>
+          <a:chExt cx="0" cy="0"/>
+        </a:xfrm>
+      </p:grpSpPr>
+      <p:sp>
+        <p:nvSpPr>
+          <p:cNvPr id="2" name="Заголовок 1">
+            <a:extLst>
+              <a:ext uri="{FF2B5EF4-FFF2-40B4-BE49-F238E27FC236}">
+                <a16:creationId xmlns:a16="http://schemas.microsoft.com/office/drawing/2014/main" id="{8E3312FC-6AD2-4DB0-80F3-82F840810862}"/>
+              </a:ext>
+            </a:extLst>
+          </p:cNvPr>
+          <p:cNvSpPr>
+            <a:spLocks noGrp="1"/>
+          </p:cNvSpPr>
+          <p:nvPr>
+            <p:ph type="title"/>
+          </p:nvPr>
+        </p:nvSpPr>
+        <p:spPr/>
+        <p:txBody>
+          <a:bodyPr/>
+          <a:lstStyle/>
+          <a:p>
+            <a:r>
+              <a:rPr lang="ru-RU" dirty="0"/>
+              <a:t>Исследования</a:t>
+            </a:r>
+          </a:p>
+        </p:txBody>
+      </p:sp>
+      <p:pic>
+        <p:nvPicPr>
+          <p:cNvPr id="9" name="Рисунок 8">
+            <a:extLst>
+              <a:ext uri="{FF2B5EF4-FFF2-40B4-BE49-F238E27FC236}">
+                <a16:creationId xmlns:a16="http://schemas.microsoft.com/office/drawing/2014/main" id="{B35E78DD-2B31-4E0F-BBB2-FFC9C92B257C}"/>
+              </a:ext>
+            </a:extLst>
+          </p:cNvPr>
+          <p:cNvPicPr>
+            <a:picLocks noChangeAspect="1"/>
+          </p:cNvPicPr>
+          <p:nvPr/>
+        </p:nvPicPr>
+        <p:blipFill>
+          <a:blip r:embed="rId2"/>
+          <a:stretch>
+            <a:fillRect/>
+          </a:stretch>
+        </p:blipFill>
+        <p:spPr>
+          <a:xfrm>
+            <a:off x="1799745" y="1102348"/>
+            <a:ext cx="5354854" cy="1419659"/>
+          </a:xfrm>
+          <a:prstGeom prst="rect">
+            <a:avLst/>
+          </a:prstGeom>
+        </p:spPr>
+      </p:pic>
+      <p:pic>
+        <p:nvPicPr>
+          <p:cNvPr id="11" name="Рисунок 10">
+            <a:extLst>
+              <a:ext uri="{FF2B5EF4-FFF2-40B4-BE49-F238E27FC236}">
+                <a16:creationId xmlns:a16="http://schemas.microsoft.com/office/drawing/2014/main" id="{BF664421-B6F4-4D91-9830-632C1EBF23B8}"/>
+              </a:ext>
+            </a:extLst>
+          </p:cNvPr>
+          <p:cNvPicPr>
+            <a:picLocks noChangeAspect="1"/>
+          </p:cNvPicPr>
+          <p:nvPr/>
+        </p:nvPicPr>
+        <p:blipFill>
+          <a:blip r:embed="rId3"/>
+          <a:stretch>
+            <a:fillRect/>
+          </a:stretch>
+        </p:blipFill>
+        <p:spPr>
+          <a:xfrm>
+            <a:off x="1799745" y="2522007"/>
+            <a:ext cx="5354854" cy="2003964"/>
+          </a:xfrm>
+          <a:prstGeom prst="rect">
+            <a:avLst/>
+          </a:prstGeom>
+        </p:spPr>
+      </p:pic>
+    </p:spTree>
+    <p:extLst>
+      <p:ext uri="{BB962C8B-B14F-4D97-AF65-F5344CB8AC3E}">
+        <p14:creationId xmlns:p14="http://schemas.microsoft.com/office/powerpoint/2010/main" val="3157978153"/>
+      </p:ext>
+    </p:extLst>
+  </p:cSld>
+  <p:clrMapOvr>
+    <a:masterClrMapping/>
+  </p:clrMapOvr>
+</p:sld>
+</file>
+
+<file path=ppt/slides/slide7.xml><?xml version="1.0" encoding="utf-8"?>
+<p:sld xmlns:a="http://schemas.openxmlformats.org/drawingml/2006/main" xmlns:r="http://schemas.openxmlformats.org/officeDocument/2006/relationships" xmlns:p="http://schemas.openxmlformats.org/presentationml/2006/main">
+  <p:cSld>
+    <p:spTree>
+      <p:nvGrpSpPr>
+        <p:cNvPr id="1" name=""/>
+        <p:cNvGrpSpPr/>
+        <p:nvPr/>
+      </p:nvGrpSpPr>
+      <p:grpSpPr>
+        <a:xfrm>
+          <a:off x="0" y="0"/>
+          <a:ext cx="0" cy="0"/>
+          <a:chOff x="0" y="0"/>
+          <a:chExt cx="0" cy="0"/>
+        </a:xfrm>
+      </p:grpSpPr>
+      <p:sp>
+        <p:nvSpPr>
+          <p:cNvPr id="2" name="Заголовок 1">
+            <a:extLst>
+              <a:ext uri="{FF2B5EF4-FFF2-40B4-BE49-F238E27FC236}">
                 <a16:creationId xmlns:a16="http://schemas.microsoft.com/office/drawing/2014/main" id="{27D70454-B963-4F38-B3AB-268DF42254CB}"/>
               </a:ext>
             </a:extLst>
@@ -8827,7 +9215,7 @@
 </p:sld>
 </file>
 
-<file path=ppt/slides/slide6.xml><?xml version="1.0" encoding="utf-8"?>
+<file path=ppt/slides/slide8.xml><?xml version="1.0" encoding="utf-8"?>
 <p:sld xmlns:a="http://schemas.openxmlformats.org/drawingml/2006/main" xmlns:r="http://schemas.openxmlformats.org/officeDocument/2006/relationships" xmlns:p="http://schemas.openxmlformats.org/presentationml/2006/main">
   <p:cSld>
     <p:spTree>
@@ -8887,7 +9275,7 @@
 </p:sld>
 </file>
 
-<file path=ppt/slides/slide7.xml><?xml version="1.0" encoding="utf-8"?>
+<file path=ppt/slides/slide9.xml><?xml version="1.0" encoding="utf-8"?>
 <p:sld xmlns:a="http://schemas.openxmlformats.org/drawingml/2006/main" xmlns:r="http://schemas.openxmlformats.org/officeDocument/2006/relationships" xmlns:p="http://schemas.openxmlformats.org/presentationml/2006/main">
   <p:cSld>
     <p:spTree>
@@ -8967,186 +9355,6 @@
     <p:extLst>
       <p:ext uri="{BB962C8B-B14F-4D97-AF65-F5344CB8AC3E}">
         <p14:creationId xmlns:p14="http://schemas.microsoft.com/office/powerpoint/2010/main" val="2343923052"/>
-      </p:ext>
-    </p:extLst>
-  </p:cSld>
-  <p:clrMapOvr>
-    <a:masterClrMapping/>
-  </p:clrMapOvr>
-</p:sld>
-</file>
-
-<file path=ppt/slides/slide8.xml><?xml version="1.0" encoding="utf-8"?>
-<p:sld xmlns:a="http://schemas.openxmlformats.org/drawingml/2006/main" xmlns:r="http://schemas.openxmlformats.org/officeDocument/2006/relationships" xmlns:p="http://schemas.openxmlformats.org/presentationml/2006/main">
-  <p:cSld>
-    <p:spTree>
-      <p:nvGrpSpPr>
-        <p:cNvPr id="1" name=""/>
-        <p:cNvGrpSpPr/>
-        <p:nvPr/>
-      </p:nvGrpSpPr>
-      <p:grpSpPr>
-        <a:xfrm>
-          <a:off x="0" y="0"/>
-          <a:ext cx="0" cy="0"/>
-          <a:chOff x="0" y="0"/>
-          <a:chExt cx="0" cy="0"/>
-        </a:xfrm>
-      </p:grpSpPr>
-      <p:pic>
-        <p:nvPicPr>
-          <p:cNvPr id="9" name="Рисунок 8">
-            <a:extLst>
-              <a:ext uri="{FF2B5EF4-FFF2-40B4-BE49-F238E27FC236}">
-                <a16:creationId xmlns:a16="http://schemas.microsoft.com/office/drawing/2014/main" id="{064F9743-649A-42D6-B21B-24BF43BF603C}"/>
-              </a:ext>
-            </a:extLst>
-          </p:cNvPr>
-          <p:cNvPicPr>
-            <a:picLocks noChangeAspect="1"/>
-          </p:cNvPicPr>
-          <p:nvPr/>
-        </p:nvPicPr>
-        <p:blipFill>
-          <a:blip r:embed="rId2"/>
-          <a:stretch>
-            <a:fillRect/>
-          </a:stretch>
-        </p:blipFill>
-        <p:spPr>
-          <a:xfrm>
-            <a:off x="59827" y="74506"/>
-            <a:ext cx="5250466" cy="2523202"/>
-          </a:xfrm>
-          <a:prstGeom prst="rect">
-            <a:avLst/>
-          </a:prstGeom>
-        </p:spPr>
-      </p:pic>
-      <p:pic>
-        <p:nvPicPr>
-          <p:cNvPr id="11" name="Рисунок 10">
-            <a:extLst>
-              <a:ext uri="{FF2B5EF4-FFF2-40B4-BE49-F238E27FC236}">
-                <a16:creationId xmlns:a16="http://schemas.microsoft.com/office/drawing/2014/main" id="{8BAF3749-B0C5-45D1-8A3A-E9A4BDC12E49}"/>
-              </a:ext>
-            </a:extLst>
-          </p:cNvPr>
-          <p:cNvPicPr>
-            <a:picLocks noChangeAspect="1"/>
-          </p:cNvPicPr>
-          <p:nvPr/>
-        </p:nvPicPr>
-        <p:blipFill>
-          <a:blip r:embed="rId3"/>
-          <a:stretch>
-            <a:fillRect/>
-          </a:stretch>
-        </p:blipFill>
-        <p:spPr>
-          <a:xfrm>
-            <a:off x="3598841" y="2465336"/>
-            <a:ext cx="5253905" cy="2523202"/>
-          </a:xfrm>
-          <a:prstGeom prst="rect">
-            <a:avLst/>
-          </a:prstGeom>
-        </p:spPr>
-      </p:pic>
-    </p:spTree>
-    <p:extLst>
-      <p:ext uri="{BB962C8B-B14F-4D97-AF65-F5344CB8AC3E}">
-        <p14:creationId xmlns:p14="http://schemas.microsoft.com/office/powerpoint/2010/main" val="4169892446"/>
-      </p:ext>
-    </p:extLst>
-  </p:cSld>
-  <p:clrMapOvr>
-    <a:masterClrMapping/>
-  </p:clrMapOvr>
-</p:sld>
-</file>
-
-<file path=ppt/slides/slide9.xml><?xml version="1.0" encoding="utf-8"?>
-<p:sld xmlns:a="http://schemas.openxmlformats.org/drawingml/2006/main" xmlns:r="http://schemas.openxmlformats.org/officeDocument/2006/relationships" xmlns:p="http://schemas.openxmlformats.org/presentationml/2006/main">
-  <p:cSld>
-    <p:spTree>
-      <p:nvGrpSpPr>
-        <p:cNvPr id="1" name=""/>
-        <p:cNvGrpSpPr/>
-        <p:nvPr/>
-      </p:nvGrpSpPr>
-      <p:grpSpPr>
-        <a:xfrm>
-          <a:off x="0" y="0"/>
-          <a:ext cx="0" cy="0"/>
-          <a:chOff x="0" y="0"/>
-          <a:chExt cx="0" cy="0"/>
-        </a:xfrm>
-      </p:grpSpPr>
-      <p:pic>
-        <p:nvPicPr>
-          <p:cNvPr id="6" name="Рисунок 5">
-            <a:extLst>
-              <a:ext uri="{FF2B5EF4-FFF2-40B4-BE49-F238E27FC236}">
-                <a16:creationId xmlns:a16="http://schemas.microsoft.com/office/drawing/2014/main" id="{1A1A6D26-AF5A-44EC-91CB-A49CB20551A7}"/>
-              </a:ext>
-            </a:extLst>
-          </p:cNvPr>
-          <p:cNvPicPr>
-            <a:picLocks noChangeAspect="1"/>
-          </p:cNvPicPr>
-          <p:nvPr/>
-        </p:nvPicPr>
-        <p:blipFill>
-          <a:blip r:embed="rId2"/>
-          <a:stretch>
-            <a:fillRect/>
-          </a:stretch>
-        </p:blipFill>
-        <p:spPr>
-          <a:xfrm>
-            <a:off x="123168" y="135191"/>
-            <a:ext cx="4448832" cy="2615018"/>
-          </a:xfrm>
-          <a:prstGeom prst="rect">
-            <a:avLst/>
-          </a:prstGeom>
-        </p:spPr>
-      </p:pic>
-      <p:pic>
-        <p:nvPicPr>
-          <p:cNvPr id="5" name="Рисунок 4">
-            <a:extLst>
-              <a:ext uri="{FF2B5EF4-FFF2-40B4-BE49-F238E27FC236}">
-                <a16:creationId xmlns:a16="http://schemas.microsoft.com/office/drawing/2014/main" id="{D7AE587F-BF27-4877-80B1-7A3D8A7FE742}"/>
-              </a:ext>
-            </a:extLst>
-          </p:cNvPr>
-          <p:cNvPicPr>
-            <a:picLocks noChangeAspect="1"/>
-          </p:cNvPicPr>
-          <p:nvPr/>
-        </p:nvPicPr>
-        <p:blipFill>
-          <a:blip r:embed="rId3"/>
-          <a:stretch>
-            <a:fillRect/>
-          </a:stretch>
-        </p:blipFill>
-        <p:spPr>
-          <a:xfrm>
-            <a:off x="3791150" y="2483995"/>
-            <a:ext cx="5068243" cy="2460181"/>
-          </a:xfrm>
-          <a:prstGeom prst="rect">
-            <a:avLst/>
-          </a:prstGeom>
-        </p:spPr>
-      </p:pic>
-    </p:spTree>
-    <p:extLst>
-      <p:ext uri="{BB962C8B-B14F-4D97-AF65-F5344CB8AC3E}">
-        <p14:creationId xmlns:p14="http://schemas.microsoft.com/office/powerpoint/2010/main" val="1062779483"/>
       </p:ext>
     </p:extLst>
   </p:cSld>

</xml_diff>